<commit_message>
inclusão nova tabela no modelo relacional
</commit_message>
<xml_diff>
--- a/PastaDocumentosProjeto/ihufrse.pptx
+++ b/PastaDocumentosProjeto/ihufrse.pptx
@@ -104,6 +104,11 @@
       </a:defRPr>
     </a:lvl9pPr>
   </p:defaultTextStyle>
+  <p:extLst>
+    <p:ext uri="{EFAFB233-063F-42B5-8137-9DF3F51BA10A}">
+      <p15:sldGuideLst xmlns:p15="http://schemas.microsoft.com/office/powerpoint/2012/main"/>
+    </p:ext>
+  </p:extLst>
 </p:presentation>
 </file>
 
@@ -3335,7 +3340,7 @@
         </p:nvSpPr>
         <p:spPr>
           <a:xfrm>
-            <a:off x="1866900" y="927100"/>
+            <a:off x="1498600" y="1253488"/>
             <a:ext cx="4343400" cy="3289300"/>
           </a:xfrm>
           <a:prstGeom prst="rect">
@@ -3363,7 +3368,11 @@
           <a:lstStyle/>
           <a:p>
             <a:pPr algn="ctr"/>
-            <a:endParaRPr lang="en-US"/>
+            <a:r>
+              <a:rPr lang="pt-BR" dirty="0"/>
+              <a:t>tab1</a:t>
+            </a:r>
+            <a:endParaRPr lang="en-US" dirty="0"/>
           </a:p>
         </p:txBody>
       </p:sp>
@@ -3409,10 +3418,189 @@
           <a:lstStyle/>
           <a:p>
             <a:pPr algn="ctr"/>
+            <a:r>
+              <a:rPr lang="pt-BR" dirty="0"/>
+              <a:t>tab2</a:t>
+            </a:r>
+            <a:endParaRPr lang="en-US" dirty="0"/>
+          </a:p>
+        </p:txBody>
+      </p:sp>
+      <p:sp>
+        <p:nvSpPr>
+          <p:cNvPr id="2" name="Isosceles Triangle 1">
+            <a:extLst>
+              <a:ext uri="{FF2B5EF4-FFF2-40B4-BE49-F238E27FC236}">
+                <a16:creationId xmlns:a16="http://schemas.microsoft.com/office/drawing/2014/main" id="{4785C310-C377-4870-B5CF-E52ACD816B5D}"/>
+              </a:ext>
+            </a:extLst>
+          </p:cNvPr>
+          <p:cNvSpPr/>
+          <p:nvPr/>
+        </p:nvSpPr>
+        <p:spPr>
+          <a:xfrm>
+            <a:off x="6553200" y="1193800"/>
+            <a:ext cx="45719" cy="45719"/>
+          </a:xfrm>
+          <a:prstGeom prst="triangle">
+            <a:avLst/>
+          </a:prstGeom>
+        </p:spPr>
+        <p:style>
+          <a:lnRef idx="2">
+            <a:schemeClr val="accent1">
+              <a:shade val="50000"/>
+            </a:schemeClr>
+          </a:lnRef>
+          <a:fillRef idx="1">
+            <a:schemeClr val="accent1"/>
+          </a:fillRef>
+          <a:effectRef idx="0">
+            <a:schemeClr val="accent1"/>
+          </a:effectRef>
+          <a:fontRef idx="minor">
+            <a:schemeClr val="lt1"/>
+          </a:fontRef>
+        </p:style>
+        <p:txBody>
+          <a:bodyPr rtlCol="0" anchor="ctr"/>
+          <a:lstStyle/>
+          <a:p>
+            <a:pPr algn="ctr"/>
             <a:endParaRPr lang="en-US"/>
           </a:p>
         </p:txBody>
       </p:sp>
+      <p:sp>
+        <p:nvSpPr>
+          <p:cNvPr id="3" name="Isosceles Triangle 2">
+            <a:extLst>
+              <a:ext uri="{FF2B5EF4-FFF2-40B4-BE49-F238E27FC236}">
+                <a16:creationId xmlns:a16="http://schemas.microsoft.com/office/drawing/2014/main" id="{0093DDD9-1282-46BE-B96A-634EE6017FC1}"/>
+              </a:ext>
+            </a:extLst>
+          </p:cNvPr>
+          <p:cNvSpPr/>
+          <p:nvPr/>
+        </p:nvSpPr>
+        <p:spPr>
+          <a:xfrm>
+            <a:off x="6342378" y="4994907"/>
+            <a:ext cx="513081" cy="1308100"/>
+          </a:xfrm>
+          <a:prstGeom prst="triangle">
+            <a:avLst>
+              <a:gd name="adj" fmla="val 47525"/>
+            </a:avLst>
+          </a:prstGeom>
+        </p:spPr>
+        <p:style>
+          <a:lnRef idx="2">
+            <a:schemeClr val="accent1">
+              <a:shade val="50000"/>
+            </a:schemeClr>
+          </a:lnRef>
+          <a:fillRef idx="1">
+            <a:schemeClr val="accent1"/>
+          </a:fillRef>
+          <a:effectRef idx="0">
+            <a:schemeClr val="accent1"/>
+          </a:effectRef>
+          <a:fontRef idx="minor">
+            <a:schemeClr val="lt1"/>
+          </a:fontRef>
+        </p:style>
+        <p:txBody>
+          <a:bodyPr rtlCol="0" anchor="ctr"/>
+          <a:lstStyle/>
+          <a:p>
+            <a:pPr algn="ctr"/>
+            <a:r>
+              <a:rPr lang="pt-BR" dirty="0"/>
+              <a:t>tab3</a:t>
+            </a:r>
+            <a:endParaRPr lang="en-US" dirty="0"/>
+          </a:p>
+        </p:txBody>
+      </p:sp>
+      <p:cxnSp>
+        <p:nvCxnSpPr>
+          <p:cNvPr id="7" name="Straight Connector 6">
+            <a:extLst>
+              <a:ext uri="{FF2B5EF4-FFF2-40B4-BE49-F238E27FC236}">
+                <a16:creationId xmlns:a16="http://schemas.microsoft.com/office/drawing/2014/main" id="{6131217F-A305-436E-ACFE-FB04E8625F91}"/>
+              </a:ext>
+            </a:extLst>
+          </p:cNvPr>
+          <p:cNvCxnSpPr>
+            <a:stCxn id="4" idx="3"/>
+            <a:endCxn id="5" idx="1"/>
+          </p:cNvCxnSpPr>
+          <p:nvPr/>
+        </p:nvCxnSpPr>
+        <p:spPr>
+          <a:xfrm flipV="1">
+            <a:off x="5842000" y="2222500"/>
+            <a:ext cx="1778000" cy="675638"/>
+          </a:xfrm>
+          <a:prstGeom prst="line">
+            <a:avLst/>
+          </a:prstGeom>
+        </p:spPr>
+        <p:style>
+          <a:lnRef idx="1">
+            <a:schemeClr val="accent1"/>
+          </a:lnRef>
+          <a:fillRef idx="0">
+            <a:schemeClr val="accent1"/>
+          </a:fillRef>
+          <a:effectRef idx="0">
+            <a:schemeClr val="accent1"/>
+          </a:effectRef>
+          <a:fontRef idx="minor">
+            <a:schemeClr val="tx1"/>
+          </a:fontRef>
+        </p:style>
+      </p:cxnSp>
+      <p:cxnSp>
+        <p:nvCxnSpPr>
+          <p:cNvPr id="9" name="Straight Connector 8">
+            <a:extLst>
+              <a:ext uri="{FF2B5EF4-FFF2-40B4-BE49-F238E27FC236}">
+                <a16:creationId xmlns:a16="http://schemas.microsoft.com/office/drawing/2014/main" id="{0ECD22F7-296F-490E-8306-22402E1C0045}"/>
+              </a:ext>
+            </a:extLst>
+          </p:cNvPr>
+          <p:cNvCxnSpPr>
+            <a:cxnSpLocks/>
+          </p:cNvCxnSpPr>
+          <p:nvPr/>
+        </p:nvCxnSpPr>
+        <p:spPr>
+          <a:xfrm>
+            <a:off x="5161277" y="4583426"/>
+            <a:ext cx="1437642" cy="411481"/>
+          </a:xfrm>
+          <a:prstGeom prst="line">
+            <a:avLst/>
+          </a:prstGeom>
+        </p:spPr>
+        <p:style>
+          <a:lnRef idx="1">
+            <a:schemeClr val="accent1"/>
+          </a:lnRef>
+          <a:fillRef idx="0">
+            <a:schemeClr val="accent1"/>
+          </a:fillRef>
+          <a:effectRef idx="0">
+            <a:schemeClr val="accent1"/>
+          </a:effectRef>
+          <a:fontRef idx="minor">
+            <a:schemeClr val="tx1"/>
+          </a:fontRef>
+        </p:style>
+      </p:cxnSp>
     </p:spTree>
     <p:extLst>
       <p:ext uri="{BB962C8B-B14F-4D97-AF65-F5344CB8AC3E}">

</xml_diff>